<commit_message>
fixed as per @collivier feedback
</commit_message>
<xml_diff>
--- a/doc/common/figures/artefacts/baraque_release.pptx
+++ b/doc/common/figures/artefacts/baraque_release.pptx
@@ -9,7 +9,7 @@
     <p:notesMasterId r:id="rId11"/>
   </p:notesMasterIdLst>
   <p:sldIdLst>
-    <p:sldId id="1756" r:id="rId8"/>
+    <p:sldId id="1758" r:id="rId8"/>
     <p:sldId id="1757" r:id="rId9"/>
     <p:sldId id="257" r:id="rId10"/>
   </p:sldIdLst>
@@ -236,7 +236,7 @@
           <a:p>
             <a:fld id="{F300692A-B8F2-48F6-B218-A4958D7E8758}" type="datetimeFigureOut">
               <a:rPr lang="en-US" smtClean="0"/>
-              <a:t>7/10/20</a:t>
+              <a:t>7/14/20</a:t>
             </a:fld>
             <a:endParaRPr lang="en-US"/>
           </a:p>
@@ -577,7 +577,7 @@
     </p:spTree>
     <p:extLst>
       <p:ext uri="{BB962C8B-B14F-4D97-AF65-F5344CB8AC3E}">
-        <p14:creationId xmlns:p14="http://schemas.microsoft.com/office/powerpoint/2010/main" val="501584422"/>
+        <p14:creationId xmlns:p14="http://schemas.microsoft.com/office/powerpoint/2010/main" val="2321637918"/>
       </p:ext>
     </p:extLst>
   </p:cSld>
@@ -778,7 +778,7 @@
           <a:p>
             <a:fld id="{2B25DCB4-1894-45C1-AC80-BB1CC7AB7AF3}" type="datetimeFigureOut">
               <a:rPr lang="en-GB" smtClean="0"/>
-              <a:t>10/07/2020</a:t>
+              <a:t>14/07/2020</a:t>
             </a:fld>
             <a:endParaRPr lang="en-GB"/>
           </a:p>
@@ -1214,7 +1214,7 @@
           <a:p>
             <a:fld id="{2B25DCB4-1894-45C1-AC80-BB1CC7AB7AF3}" type="datetimeFigureOut">
               <a:rPr lang="en-GB" smtClean="0"/>
-              <a:t>10/07/2020</a:t>
+              <a:t>14/07/2020</a:t>
             </a:fld>
             <a:endParaRPr lang="en-GB"/>
           </a:p>
@@ -1464,7 +1464,7 @@
           <a:p>
             <a:fld id="{2B25DCB4-1894-45C1-AC80-BB1CC7AB7AF3}" type="datetimeFigureOut">
               <a:rPr lang="en-GB" smtClean="0"/>
-              <a:t>10/07/2020</a:t>
+              <a:t>14/07/2020</a:t>
             </a:fld>
             <a:endParaRPr lang="en-GB"/>
           </a:p>
@@ -1772,7 +1772,7 @@
           <a:p>
             <a:fld id="{2B25DCB4-1894-45C1-AC80-BB1CC7AB7AF3}" type="datetimeFigureOut">
               <a:rPr lang="en-GB" smtClean="0"/>
-              <a:t>10/07/2020</a:t>
+              <a:t>14/07/2020</a:t>
             </a:fld>
             <a:endParaRPr lang="en-GB"/>
           </a:p>
@@ -2090,7 +2090,7 @@
           <a:p>
             <a:fld id="{2B25DCB4-1894-45C1-AC80-BB1CC7AB7AF3}" type="datetimeFigureOut">
               <a:rPr lang="en-GB" smtClean="0"/>
-              <a:t>10/07/2020</a:t>
+              <a:t>14/07/2020</a:t>
             </a:fld>
             <a:endParaRPr lang="en-GB"/>
           </a:p>
@@ -2392,7 +2392,7 @@
           <a:p>
             <a:fld id="{2B25DCB4-1894-45C1-AC80-BB1CC7AB7AF3}" type="datetimeFigureOut">
               <a:rPr lang="en-GB" smtClean="0"/>
-              <a:t>10/07/2020</a:t>
+              <a:t>14/07/2020</a:t>
             </a:fld>
             <a:endParaRPr lang="en-GB"/>
           </a:p>
@@ -2759,7 +2759,7 @@
           <a:p>
             <a:fld id="{2B25DCB4-1894-45C1-AC80-BB1CC7AB7AF3}" type="datetimeFigureOut">
               <a:rPr lang="en-GB" smtClean="0"/>
-              <a:t>10/07/2020</a:t>
+              <a:t>14/07/2020</a:t>
             </a:fld>
             <a:endParaRPr lang="en-GB"/>
           </a:p>
@@ -2933,7 +2933,7 @@
           <a:p>
             <a:fld id="{2B25DCB4-1894-45C1-AC80-BB1CC7AB7AF3}" type="datetimeFigureOut">
               <a:rPr lang="en-GB" smtClean="0"/>
-              <a:t>10/07/2020</a:t>
+              <a:t>14/07/2020</a:t>
             </a:fld>
             <a:endParaRPr lang="en-GB"/>
           </a:p>
@@ -3113,7 +3113,7 @@
           <a:p>
             <a:fld id="{2B25DCB4-1894-45C1-AC80-BB1CC7AB7AF3}" type="datetimeFigureOut">
               <a:rPr lang="en-GB" smtClean="0"/>
-              <a:t>10/07/2020</a:t>
+              <a:t>14/07/2020</a:t>
             </a:fld>
             <a:endParaRPr lang="en-GB"/>
           </a:p>
@@ -3305,7 +3305,7 @@
           <a:p>
             <a:fld id="{432668E7-1494-4367-8917-840B541A68C2}" type="datetimeFigureOut">
               <a:rPr lang="en-GB" smtClean="0"/>
-              <a:t>10/07/2020</a:t>
+              <a:t>14/07/2020</a:t>
             </a:fld>
             <a:endParaRPr lang="en-GB"/>
           </a:p>
@@ -3475,7 +3475,7 @@
           <a:p>
             <a:fld id="{432668E7-1494-4367-8917-840B541A68C2}" type="datetimeFigureOut">
               <a:rPr lang="en-GB" smtClean="0"/>
-              <a:t>10/07/2020</a:t>
+              <a:t>14/07/2020</a:t>
             </a:fld>
             <a:endParaRPr lang="en-GB"/>
           </a:p>
@@ -3645,7 +3645,7 @@
           <a:p>
             <a:fld id="{2B25DCB4-1894-45C1-AC80-BB1CC7AB7AF3}" type="datetimeFigureOut">
               <a:rPr lang="en-GB" smtClean="0"/>
-              <a:t>10/07/2020</a:t>
+              <a:t>14/07/2020</a:t>
             </a:fld>
             <a:endParaRPr lang="en-GB"/>
           </a:p>
@@ -3891,7 +3891,7 @@
           <a:p>
             <a:fld id="{432668E7-1494-4367-8917-840B541A68C2}" type="datetimeFigureOut">
               <a:rPr lang="en-GB" smtClean="0"/>
-              <a:t>10/07/2020</a:t>
+              <a:t>14/07/2020</a:t>
             </a:fld>
             <a:endParaRPr lang="en-GB"/>
           </a:p>
@@ -4123,7 +4123,7 @@
           <a:p>
             <a:fld id="{432668E7-1494-4367-8917-840B541A68C2}" type="datetimeFigureOut">
               <a:rPr lang="en-GB" smtClean="0"/>
-              <a:t>10/07/2020</a:t>
+              <a:t>14/07/2020</a:t>
             </a:fld>
             <a:endParaRPr lang="en-GB"/>
           </a:p>
@@ -4490,7 +4490,7 @@
           <a:p>
             <a:fld id="{432668E7-1494-4367-8917-840B541A68C2}" type="datetimeFigureOut">
               <a:rPr lang="en-GB" smtClean="0"/>
-              <a:t>10/07/2020</a:t>
+              <a:t>14/07/2020</a:t>
             </a:fld>
             <a:endParaRPr lang="en-GB"/>
           </a:p>
@@ -4608,7 +4608,7 @@
           <a:p>
             <a:fld id="{432668E7-1494-4367-8917-840B541A68C2}" type="datetimeFigureOut">
               <a:rPr lang="en-GB" smtClean="0"/>
-              <a:t>10/07/2020</a:t>
+              <a:t>14/07/2020</a:t>
             </a:fld>
             <a:endParaRPr lang="en-GB"/>
           </a:p>
@@ -4703,7 +4703,7 @@
           <a:p>
             <a:fld id="{432668E7-1494-4367-8917-840B541A68C2}" type="datetimeFigureOut">
               <a:rPr lang="en-GB" smtClean="0"/>
-              <a:t>10/07/2020</a:t>
+              <a:t>14/07/2020</a:t>
             </a:fld>
             <a:endParaRPr lang="en-GB"/>
           </a:p>
@@ -4980,7 +4980,7 @@
           <a:p>
             <a:fld id="{432668E7-1494-4367-8917-840B541A68C2}" type="datetimeFigureOut">
               <a:rPr lang="en-GB" smtClean="0"/>
-              <a:t>10/07/2020</a:t>
+              <a:t>14/07/2020</a:t>
             </a:fld>
             <a:endParaRPr lang="en-GB"/>
           </a:p>
@@ -5233,7 +5233,7 @@
           <a:p>
             <a:fld id="{432668E7-1494-4367-8917-840B541A68C2}" type="datetimeFigureOut">
               <a:rPr lang="en-GB" smtClean="0"/>
-              <a:t>10/07/2020</a:t>
+              <a:t>14/07/2020</a:t>
             </a:fld>
             <a:endParaRPr lang="en-GB"/>
           </a:p>
@@ -5403,7 +5403,7 @@
           <a:p>
             <a:fld id="{432668E7-1494-4367-8917-840B541A68C2}" type="datetimeFigureOut">
               <a:rPr lang="en-GB" smtClean="0"/>
-              <a:t>10/07/2020</a:t>
+              <a:t>14/07/2020</a:t>
             </a:fld>
             <a:endParaRPr lang="en-GB"/>
           </a:p>
@@ -5583,7 +5583,7 @@
           <a:p>
             <a:fld id="{432668E7-1494-4367-8917-840B541A68C2}" type="datetimeFigureOut">
               <a:rPr lang="en-GB" smtClean="0"/>
-              <a:t>10/07/2020</a:t>
+              <a:t>14/07/2020</a:t>
             </a:fld>
             <a:endParaRPr lang="en-GB"/>
           </a:p>
@@ -6209,7 +6209,7 @@
           <a:p>
             <a:fld id="{2B25DCB4-1894-45C1-AC80-BB1CC7AB7AF3}" type="datetimeFigureOut">
               <a:rPr lang="en-GB" smtClean="0"/>
-              <a:t>10/07/2020</a:t>
+              <a:t>14/07/2020</a:t>
             </a:fld>
             <a:endParaRPr lang="en-GB"/>
           </a:p>
@@ -6445,7 +6445,7 @@
           <a:p>
             <a:fld id="{2B25DCB4-1894-45C1-AC80-BB1CC7AB7AF3}" type="datetimeFigureOut">
               <a:rPr lang="en-GB" smtClean="0"/>
-              <a:t>10/07/2020</a:t>
+              <a:t>14/07/2020</a:t>
             </a:fld>
             <a:endParaRPr lang="en-GB"/>
           </a:p>
@@ -6827,7 +6827,7 @@
           <a:p>
             <a:fld id="{2B25DCB4-1894-45C1-AC80-BB1CC7AB7AF3}" type="datetimeFigureOut">
               <a:rPr lang="en-GB" smtClean="0"/>
-              <a:t>10/07/2020</a:t>
+              <a:t>14/07/2020</a:t>
             </a:fld>
             <a:endParaRPr lang="en-GB"/>
           </a:p>
@@ -6945,7 +6945,7 @@
           <a:p>
             <a:fld id="{2B25DCB4-1894-45C1-AC80-BB1CC7AB7AF3}" type="datetimeFigureOut">
               <a:rPr lang="en-GB" smtClean="0"/>
-              <a:t>10/07/2020</a:t>
+              <a:t>14/07/2020</a:t>
             </a:fld>
             <a:endParaRPr lang="en-GB"/>
           </a:p>
@@ -7040,7 +7040,7 @@
           <a:p>
             <a:fld id="{2B25DCB4-1894-45C1-AC80-BB1CC7AB7AF3}" type="datetimeFigureOut">
               <a:rPr lang="en-GB" smtClean="0"/>
-              <a:t>10/07/2020</a:t>
+              <a:t>14/07/2020</a:t>
             </a:fld>
             <a:endParaRPr lang="en-GB"/>
           </a:p>
@@ -7295,7 +7295,7 @@
           <a:p>
             <a:fld id="{2B25DCB4-1894-45C1-AC80-BB1CC7AB7AF3}" type="datetimeFigureOut">
               <a:rPr lang="en-GB" smtClean="0"/>
-              <a:t>10/07/2020</a:t>
+              <a:t>14/07/2020</a:t>
             </a:fld>
             <a:endParaRPr lang="en-GB"/>
           </a:p>
@@ -7578,7 +7578,7 @@
           <a:p>
             <a:fld id="{2B25DCB4-1894-45C1-AC80-BB1CC7AB7AF3}" type="datetimeFigureOut">
               <a:rPr lang="en-GB" smtClean="0"/>
-              <a:t>10/07/2020</a:t>
+              <a:t>14/07/2020</a:t>
             </a:fld>
             <a:endParaRPr lang="en-GB"/>
           </a:p>
@@ -7984,7 +7984,7 @@
           <a:p>
             <a:fld id="{2B25DCB4-1894-45C1-AC80-BB1CC7AB7AF3}" type="datetimeFigureOut">
               <a:rPr lang="en-GB" smtClean="0"/>
-              <a:t>10/07/2020</a:t>
+              <a:t>14/07/2020</a:t>
             </a:fld>
             <a:endParaRPr lang="en-GB"/>
           </a:p>
@@ -8654,7 +8654,7 @@
           <a:p>
             <a:fld id="{432668E7-1494-4367-8917-840B541A68C2}" type="datetimeFigureOut">
               <a:rPr lang="en-GB" smtClean="0"/>
-              <a:t>10/07/2020</a:t>
+              <a:t>14/07/2020</a:t>
             </a:fld>
             <a:endParaRPr lang="en-GB"/>
           </a:p>
@@ -10170,7 +10170,7 @@
                   </a:schemeClr>
                 </a:solidFill>
               </a:rPr>
-              <a:t>OVP Badge.</a:t>
+              <a:t>Feeding into OVP Program*</a:t>
             </a:r>
           </a:p>
         </p:txBody>
@@ -10558,7 +10558,7 @@
         </p:nvSpPr>
         <p:spPr>
           <a:xfrm>
-            <a:off x="2735135" y="2989779"/>
+            <a:off x="2834104" y="2979958"/>
             <a:ext cx="252000" cy="253692"/>
           </a:xfrm>
           <a:prstGeom prst="star5">
@@ -10612,7 +10612,7 @@
         </p:nvSpPr>
         <p:spPr>
           <a:xfrm>
-            <a:off x="5402657" y="2124218"/>
+            <a:off x="5489915" y="2108620"/>
             <a:ext cx="252000" cy="253692"/>
           </a:xfrm>
           <a:prstGeom prst="star5">
@@ -10666,8 +10666,8 @@
         </p:nvSpPr>
         <p:spPr>
           <a:xfrm>
-            <a:off x="7343340" y="2332261"/>
-            <a:ext cx="252000" cy="253692"/>
+            <a:off x="3822668" y="5687242"/>
+            <a:ext cx="396616" cy="388177"/>
           </a:xfrm>
           <a:prstGeom prst="star5">
             <a:avLst/>
@@ -10828,7 +10828,7 @@
         </p:nvSpPr>
         <p:spPr>
           <a:xfrm>
-            <a:off x="5100171" y="4192414"/>
+            <a:off x="5209841" y="4211751"/>
             <a:ext cx="252000" cy="253692"/>
           </a:xfrm>
           <a:prstGeom prst="star5">
@@ -10882,7 +10882,7 @@
         </p:nvSpPr>
         <p:spPr>
           <a:xfrm>
-            <a:off x="8448070" y="4196862"/>
+            <a:off x="8638714" y="4200565"/>
             <a:ext cx="252000" cy="253692"/>
           </a:xfrm>
           <a:prstGeom prst="star5">
@@ -10936,7 +10936,7 @@
         </p:nvSpPr>
         <p:spPr>
           <a:xfrm>
-            <a:off x="10681874" y="4412809"/>
+            <a:off x="10801143" y="4434900"/>
             <a:ext cx="252000" cy="253692"/>
           </a:xfrm>
           <a:prstGeom prst="star5">
@@ -10976,10 +10976,60 @@
           </a:p>
         </p:txBody>
       </p:sp>
+      <p:sp>
+        <p:nvSpPr>
+          <p:cNvPr id="39" name="TextBox 38">
+            <a:extLst>
+              <a:ext uri="{FF2B5EF4-FFF2-40B4-BE49-F238E27FC236}">
+                <a16:creationId xmlns:a16="http://schemas.microsoft.com/office/drawing/2014/main" id="{EB8D4A21-4B92-5940-BBEF-AEFA0AC16DCF}"/>
+              </a:ext>
+            </a:extLst>
+          </p:cNvPr>
+          <p:cNvSpPr txBox="1"/>
+          <p:nvPr/>
+        </p:nvSpPr>
+        <p:spPr>
+          <a:xfrm>
+            <a:off x="511760" y="5552199"/>
+            <a:ext cx="3618314" cy="523220"/>
+          </a:xfrm>
+          <a:prstGeom prst="rect">
+            <a:avLst/>
+          </a:prstGeom>
+          <a:noFill/>
+        </p:spPr>
+        <p:txBody>
+          <a:bodyPr wrap="square" rtlCol="0">
+            <a:spAutoFit/>
+          </a:bodyPr>
+          <a:lstStyle/>
+          <a:p>
+            <a:endParaRPr lang="en-US" sz="1400" b="1" dirty="0">
+              <a:solidFill>
+                <a:schemeClr val="accent6">
+                  <a:lumMod val="10000"/>
+                </a:schemeClr>
+              </a:solidFill>
+            </a:endParaRPr>
+          </a:p>
+          <a:p>
+            <a:r>
+              <a:rPr lang="en-US" sz="1400" b="1" dirty="0">
+                <a:solidFill>
+                  <a:schemeClr val="accent6">
+                    <a:lumMod val="10000"/>
+                  </a:schemeClr>
+                </a:solidFill>
+              </a:rPr>
+              <a:t>* LFN OVP Badge Program to use CNTT RC1</a:t>
+            </a:r>
+          </a:p>
+        </p:txBody>
+      </p:sp>
     </p:spTree>
     <p:extLst>
       <p:ext uri="{BB962C8B-B14F-4D97-AF65-F5344CB8AC3E}">
-        <p14:creationId xmlns:p14="http://schemas.microsoft.com/office/powerpoint/2010/main" val="4120844334"/>
+        <p14:creationId xmlns:p14="http://schemas.microsoft.com/office/powerpoint/2010/main" val="3723888931"/>
       </p:ext>
     </p:extLst>
   </p:cSld>
@@ -12974,27 +13024,10 @@
 
 <file path=customXml/item1.xml><?xml version="1.0" encoding="utf-8"?>
 <?mso-contentType ?>
-<FormTemplates xmlns="http://schemas.microsoft.com/sharepoint/v3/contenttype/forms">
-  <Display>DocumentLibraryForm</Display>
-  <Edit>DocumentLibraryForm</Edit>
-  <New>DocumentLibraryForm</New>
-</FormTemplates>
+<SharedContentType xmlns="Microsoft.SharePoint.Taxonomy.ContentTypeSync" SourceId="34c87397-5fc1-491e-85e7-d6110dbe9cbd" ContentTypeId="0x0101" PreviousValue="false"/>
 </file>
 
 <file path=customXml/item2.xml><?xml version="1.0" encoding="utf-8"?>
-<?mso-contentType ?>
-<spe:Receivers xmlns:spe="http://schemas.microsoft.com/sharepoint/events"/>
-</file>
-
-<file path=customXml/item3.xml><?xml version="1.0" encoding="utf-8"?>
-<p:properties xmlns:p="http://schemas.microsoft.com/office/2006/metadata/properties" xmlns:xsi="http://www.w3.org/2001/XMLSchema-instance" xmlns:pc="http://schemas.microsoft.com/office/infopath/2007/PartnerControls">
-  <documentManagement>
-    <HideFromDelve xmlns="71c5aaf6-e6ce-465b-b873-5148d2a4c105">false</HideFromDelve>
-  </documentManagement>
-</p:properties>
-</file>
-
-<file path=customXml/item4.xml><?xml version="1.0" encoding="utf-8"?>
 <ct:contentTypeSchema xmlns:ct="http://schemas.microsoft.com/office/2006/metadata/contentType" xmlns:ma="http://schemas.microsoft.com/office/2006/metadata/properties/metaAttributes" ct:_="" ma:_="" ma:contentTypeName="Document" ma:contentTypeID="0x01010091DAD41AE1C547499DAD32324FDBCA83" ma:contentTypeVersion="13" ma:contentTypeDescription="Create a new document." ma:contentTypeScope="" ma:versionID="1ab863d2059f69f1ed6dd099eaf27f0d">
   <xsd:schema xmlns:xsd="http://www.w3.org/2001/XMLSchema" xmlns:xs="http://www.w3.org/2001/XMLSchema" xmlns:p="http://schemas.microsoft.com/office/2006/metadata/properties" xmlns:ns3="71c5aaf6-e6ce-465b-b873-5148d2a4c105" xmlns:ns4="3ff68e1f-d7e3-4b4f-a3e0-07f53f4abd0b" xmlns:ns5="12bbbc51-f7e9-481b-afc6-59484cfedc35" targetNamespace="http://schemas.microsoft.com/office/2006/metadata/properties" ma:root="true" ma:fieldsID="3a6160405decfdfbb18e32386012a6fa" ns3:_="" ns4:_="" ns5:_="">
     <xsd:import namespace="71c5aaf6-e6ce-465b-b873-5148d2a4c105"/>
@@ -13253,23 +13286,52 @@
 </ct:contentTypeSchema>
 </file>
 
+<file path=customXml/item3.xml><?xml version="1.0" encoding="utf-8"?>
+<p:properties xmlns:p="http://schemas.microsoft.com/office/2006/metadata/properties" xmlns:xsi="http://www.w3.org/2001/XMLSchema-instance" xmlns:pc="http://schemas.microsoft.com/office/infopath/2007/PartnerControls">
+  <documentManagement>
+    <HideFromDelve xmlns="71c5aaf6-e6ce-465b-b873-5148d2a4c105">false</HideFromDelve>
+  </documentManagement>
+</p:properties>
+</file>
+
+<file path=customXml/item4.xml><?xml version="1.0" encoding="utf-8"?>
+<?mso-contentType ?>
+<spe:Receivers xmlns:spe="http://schemas.microsoft.com/sharepoint/events"/>
+</file>
+
 <file path=customXml/item5.xml><?xml version="1.0" encoding="utf-8"?>
 <?mso-contentType ?>
-<SharedContentType xmlns="Microsoft.SharePoint.Taxonomy.ContentTypeSync" SourceId="34c87397-5fc1-491e-85e7-d6110dbe9cbd" ContentTypeId="0x0101" PreviousValue="false"/>
+<FormTemplates xmlns="http://schemas.microsoft.com/sharepoint/v3/contenttype/forms">
+  <Display>DocumentLibraryForm</Display>
+  <Edit>DocumentLibraryForm</Edit>
+  <New>DocumentLibraryForm</New>
+</FormTemplates>
 </file>
 
 <file path=customXml/itemProps1.xml><?xml version="1.0" encoding="utf-8"?>
-<ds:datastoreItem xmlns:ds="http://schemas.openxmlformats.org/officeDocument/2006/customXml" ds:itemID="{8BC17643-53A5-405A-B9B1-87CE5FC88437}">
+<ds:datastoreItem xmlns:ds="http://schemas.openxmlformats.org/officeDocument/2006/customXml" ds:itemID="{E360BA89-B7F5-4FB2-A74F-ECBBA0451469}">
   <ds:schemaRefs>
-    <ds:schemaRef ds:uri="http://schemas.microsoft.com/sharepoint/v3/contenttype/forms"/>
+    <ds:schemaRef ds:uri="Microsoft.SharePoint.Taxonomy.ContentTypeSync"/>
   </ds:schemaRefs>
 </ds:datastoreItem>
 </file>
 
 <file path=customXml/itemProps2.xml><?xml version="1.0" encoding="utf-8"?>
-<ds:datastoreItem xmlns:ds="http://schemas.openxmlformats.org/officeDocument/2006/customXml" ds:itemID="{97A23D90-2540-4E36-96F5-8450B78BA858}">
+<ds:datastoreItem xmlns:ds="http://schemas.openxmlformats.org/officeDocument/2006/customXml" ds:itemID="{7D1B5469-50FC-4BB1-A7E7-6ED7580E62DE}">
   <ds:schemaRefs>
-    <ds:schemaRef ds:uri="http://schemas.microsoft.com/sharepoint/events"/>
+    <ds:schemaRef ds:uri="http://schemas.microsoft.com/office/2006/metadata/contentType"/>
+    <ds:schemaRef ds:uri="http://schemas.microsoft.com/office/2006/metadata/properties/metaAttributes"/>
+    <ds:schemaRef ds:uri="http://www.w3.org/2001/XMLSchema"/>
+    <ds:schemaRef ds:uri="http://schemas.microsoft.com/office/2006/metadata/properties"/>
+    <ds:schemaRef ds:uri="71c5aaf6-e6ce-465b-b873-5148d2a4c105"/>
+    <ds:schemaRef ds:uri="3ff68e1f-d7e3-4b4f-a3e0-07f53f4abd0b"/>
+    <ds:schemaRef ds:uri="12bbbc51-f7e9-481b-afc6-59484cfedc35"/>
+    <ds:schemaRef ds:uri="http://schemas.microsoft.com/office/2006/documentManagement/types"/>
+    <ds:schemaRef ds:uri="http://schemas.microsoft.com/office/infopath/2007/PartnerControls"/>
+    <ds:schemaRef ds:uri="http://schemas.openxmlformats.org/package/2006/metadata/core-properties"/>
+    <ds:schemaRef ds:uri="http://purl.org/dc/elements/1.1/"/>
+    <ds:schemaRef ds:uri="http://purl.org/dc/terms/"/>
+    <ds:schemaRef ds:uri="http://schemas.microsoft.com/internal/obd"/>
   </ds:schemaRefs>
 </ds:datastoreItem>
 </file>
@@ -13293,29 +13355,17 @@
 </file>
 
 <file path=customXml/itemProps4.xml><?xml version="1.0" encoding="utf-8"?>
-<ds:datastoreItem xmlns:ds="http://schemas.openxmlformats.org/officeDocument/2006/customXml" ds:itemID="{7D1B5469-50FC-4BB1-A7E7-6ED7580E62DE}">
+<ds:datastoreItem xmlns:ds="http://schemas.openxmlformats.org/officeDocument/2006/customXml" ds:itemID="{97A23D90-2540-4E36-96F5-8450B78BA858}">
   <ds:schemaRefs>
-    <ds:schemaRef ds:uri="http://schemas.microsoft.com/office/2006/metadata/contentType"/>
-    <ds:schemaRef ds:uri="http://schemas.microsoft.com/office/2006/metadata/properties/metaAttributes"/>
-    <ds:schemaRef ds:uri="http://www.w3.org/2001/XMLSchema"/>
-    <ds:schemaRef ds:uri="http://schemas.microsoft.com/office/2006/metadata/properties"/>
-    <ds:schemaRef ds:uri="71c5aaf6-e6ce-465b-b873-5148d2a4c105"/>
-    <ds:schemaRef ds:uri="3ff68e1f-d7e3-4b4f-a3e0-07f53f4abd0b"/>
-    <ds:schemaRef ds:uri="12bbbc51-f7e9-481b-afc6-59484cfedc35"/>
-    <ds:schemaRef ds:uri="http://schemas.microsoft.com/office/2006/documentManagement/types"/>
-    <ds:schemaRef ds:uri="http://schemas.microsoft.com/office/infopath/2007/PartnerControls"/>
-    <ds:schemaRef ds:uri="http://schemas.openxmlformats.org/package/2006/metadata/core-properties"/>
-    <ds:schemaRef ds:uri="http://purl.org/dc/elements/1.1/"/>
-    <ds:schemaRef ds:uri="http://purl.org/dc/terms/"/>
-    <ds:schemaRef ds:uri="http://schemas.microsoft.com/internal/obd"/>
+    <ds:schemaRef ds:uri="http://schemas.microsoft.com/sharepoint/events"/>
   </ds:schemaRefs>
 </ds:datastoreItem>
 </file>
 
 <file path=customXml/itemProps5.xml><?xml version="1.0" encoding="utf-8"?>
-<ds:datastoreItem xmlns:ds="http://schemas.openxmlformats.org/officeDocument/2006/customXml" ds:itemID="{E360BA89-B7F5-4FB2-A74F-ECBBA0451469}">
+<ds:datastoreItem xmlns:ds="http://schemas.openxmlformats.org/officeDocument/2006/customXml" ds:itemID="{8BC17643-53A5-405A-B9B1-87CE5FC88437}">
   <ds:schemaRefs>
-    <ds:schemaRef ds:uri="Microsoft.SharePoint.Taxonomy.ContentTypeSync"/>
+    <ds:schemaRef ds:uri="http://schemas.microsoft.com/sharepoint/v3/contenttype/forms"/>
   </ds:schemaRefs>
 </ds:datastoreItem>
 </file>
</xml_diff>